<commit_message>
Updating slides to include updated page link.
</commit_message>
<xml_diff>
--- a/slides/isc19_intro_to_containers_ajy.pptx
+++ b/slides/isc19_intro_to_containers_ajy.pptx
@@ -23538,7 +23538,7 @@
               <a:rPr lang="en-US" sz="2800" dirty="0">
                 <a:hlinkClick r:id="rId2"/>
               </a:rPr>
-              <a:t>https://github.com/ecpcontainers/isc19-tutorial</a:t>
+              <a:t>https://ecpcontainers.github.io/isc19-tutorial/</a:t>
             </a:r>
             <a:endParaRPr lang="en-US" sz="2800" dirty="0"/>
           </a:p>
@@ -23811,11 +23811,8 @@
               <a:rPr lang="en-US" dirty="0">
                 <a:hlinkClick r:id="rId2"/>
               </a:rPr>
-              <a:t>https://github.com/ecpcontainers/isc19-tutorial</a:t>
-            </a:r>
-            <a:endParaRPr lang="en-US" dirty="0"/>
-          </a:p>
-          <a:p>
+              <a:t>https://ecpcontainers.github.io/isc19-tutorial/</a:t>
+            </a:r>
             <a:endParaRPr lang="en-US" dirty="0"/>
           </a:p>
         </p:txBody>

</xml_diff>